<commit_message>
bags corection in the function  ElvCabinSwitchToNextPhase()
</commit_message>
<xml_diff>
--- a/ElevatorControl/Presentation.pptx
+++ b/ElevatorControl/Presentation.pptx
@@ -7,7 +7,7 @@
     <p:sldMasterId id="2147483706" r:id="rId3"/>
   </p:sldMasterIdLst>
   <p:notesMasterIdLst>
-    <p:notesMasterId r:id="rId19"/>
+    <p:notesMasterId r:id="rId20"/>
   </p:notesMasterIdLst>
   <p:sldIdLst>
     <p:sldId id="256" r:id="rId4"/>
@@ -19,43 +19,44 @@
     <p:sldId id="262" r:id="rId10"/>
     <p:sldId id="263" r:id="rId11"/>
     <p:sldId id="264" r:id="rId12"/>
-    <p:sldId id="265" r:id="rId13"/>
-    <p:sldId id="266" r:id="rId14"/>
-    <p:sldId id="270" r:id="rId15"/>
-    <p:sldId id="267" r:id="rId16"/>
-    <p:sldId id="268" r:id="rId17"/>
-    <p:sldId id="269" r:id="rId18"/>
+    <p:sldId id="271" r:id="rId13"/>
+    <p:sldId id="265" r:id="rId14"/>
+    <p:sldId id="266" r:id="rId15"/>
+    <p:sldId id="270" r:id="rId16"/>
+    <p:sldId id="267" r:id="rId17"/>
+    <p:sldId id="268" r:id="rId18"/>
+    <p:sldId id="269" r:id="rId19"/>
   </p:sldIdLst>
   <p:sldSz cx="9144000" cy="5143500" type="screen16x9"/>
   <p:notesSz cx="6858000" cy="9144000"/>
   <p:embeddedFontLst>
     <p:embeddedFont>
-      <p:font typeface="Raleway" panose="020B0604020202020204" charset="-52"/>
-      <p:regular r:id="rId20"/>
-      <p:bold r:id="rId21"/>
-      <p:italic r:id="rId22"/>
-      <p:boldItalic r:id="rId23"/>
+      <p:font typeface="Lato" panose="020B0604020202020204" charset="0"/>
+      <p:regular r:id="rId21"/>
+      <p:bold r:id="rId22"/>
+      <p:italic r:id="rId23"/>
+      <p:boldItalic r:id="rId24"/>
+    </p:embeddedFont>
+    <p:embeddedFont>
+      <p:font typeface="Helvetica Neue" panose="020B0604020202020204" charset="0"/>
+      <p:regular r:id="rId25"/>
+      <p:bold r:id="rId26"/>
+      <p:italic r:id="rId27"/>
+      <p:boldItalic r:id="rId28"/>
     </p:embeddedFont>
     <p:embeddedFont>
       <p:font typeface="Calibri" panose="020F0502020204030204" pitchFamily="34" charset="0"/>
-      <p:regular r:id="rId24"/>
-      <p:bold r:id="rId25"/>
-      <p:italic r:id="rId26"/>
-      <p:boldItalic r:id="rId27"/>
+      <p:regular r:id="rId29"/>
+      <p:bold r:id="rId30"/>
+      <p:italic r:id="rId31"/>
+      <p:boldItalic r:id="rId32"/>
     </p:embeddedFont>
     <p:embeddedFont>
-      <p:font typeface="Helvetica Neue" panose="020B0604020202020204" charset="0"/>
-      <p:regular r:id="rId28"/>
-      <p:bold r:id="rId29"/>
-      <p:italic r:id="rId30"/>
-      <p:boldItalic r:id="rId31"/>
-    </p:embeddedFont>
-    <p:embeddedFont>
-      <p:font typeface="Lato" panose="020B0604020202020204" charset="0"/>
-      <p:regular r:id="rId32"/>
-      <p:bold r:id="rId33"/>
-      <p:italic r:id="rId34"/>
-      <p:boldItalic r:id="rId35"/>
+      <p:font typeface="Raleway" panose="020B0604020202020204" charset="-52"/>
+      <p:regular r:id="rId33"/>
+      <p:bold r:id="rId34"/>
+      <p:italic r:id="rId35"/>
+      <p:boldItalic r:id="rId36"/>
     </p:embeddedFont>
   </p:embeddedFontLst>
   <p:defaultTextStyle>
@@ -37558,6 +37559,659 @@
       </p:grpSpPr>
       <p:sp>
         <p:nvSpPr>
+          <p:cNvPr id="3" name="TextBox 2"/>
+          <p:cNvSpPr txBox="1"/>
+          <p:nvPr/>
+        </p:nvSpPr>
+        <p:spPr>
+          <a:xfrm>
+            <a:off x="0" y="0"/>
+            <a:ext cx="8833200" cy="2831544"/>
+          </a:xfrm>
+          <a:prstGeom prst="rect">
+            <a:avLst/>
+          </a:prstGeom>
+          <a:noFill/>
+        </p:spPr>
+        <p:txBody>
+          <a:bodyPr wrap="square" rtlCol="0">
+            <a:spAutoFit/>
+          </a:bodyPr>
+          <a:lstStyle/>
+          <a:p>
+            <a:r>
+              <a:rPr lang="ru-RU" sz="1200" b="1" dirty="0">
+                <a:solidFill>
+                  <a:schemeClr val="bg2"/>
+                </a:solidFill>
+              </a:rPr>
+              <a:t>В</a:t>
+            </a:r>
+            <a:r>
+              <a:rPr lang="ru-RU" sz="1200" b="1" dirty="0" smtClean="0">
+                <a:solidFill>
+                  <a:schemeClr val="bg2"/>
+                </a:solidFill>
+              </a:rPr>
+              <a:t>нешняя кнопка больше текущего этажа:</a:t>
+            </a:r>
+            <a:endParaRPr lang="ru-RU" sz="1100" dirty="0" smtClean="0">
+              <a:solidFill>
+                <a:schemeClr val="bg2"/>
+              </a:solidFill>
+            </a:endParaRPr>
+          </a:p>
+          <a:p>
+            <a:pPr marL="171450" indent="-171450">
+              <a:buFont typeface="Arial" panose="020B0604020202020204" pitchFamily="34" charset="0"/>
+              <a:buChar char="•"/>
+            </a:pPr>
+            <a:r>
+              <a:rPr lang="ru-RU" sz="1100" dirty="0" err="1" smtClean="0">
+                <a:solidFill>
+                  <a:schemeClr val="bg2"/>
+                </a:solidFill>
+              </a:rPr>
+              <a:t>Закрываютьс</a:t>
+            </a:r>
+            <a:r>
+              <a:rPr lang="ru-RU" sz="1100" dirty="0" smtClean="0">
+                <a:solidFill>
+                  <a:schemeClr val="bg2"/>
+                </a:solidFill>
+              </a:rPr>
+              <a:t> двери</a:t>
+            </a:r>
+          </a:p>
+          <a:p>
+            <a:pPr marL="171450" indent="-171450">
+              <a:buFont typeface="Arial" panose="020B0604020202020204" pitchFamily="34" charset="0"/>
+              <a:buChar char="•"/>
+            </a:pPr>
+            <a:r>
+              <a:rPr lang="ru-RU" sz="1100" dirty="0" smtClean="0">
+                <a:solidFill>
+                  <a:schemeClr val="bg2"/>
+                </a:solidFill>
+              </a:rPr>
+              <a:t>Активируем </a:t>
+            </a:r>
+            <a:r>
+              <a:rPr lang="ru-RU" sz="1100" dirty="0" smtClean="0">
+                <a:solidFill>
+                  <a:schemeClr val="bg2"/>
+                </a:solidFill>
+              </a:rPr>
+              <a:t>медленное движение вверх – </a:t>
+            </a:r>
+            <a:r>
+              <a:rPr lang="ru-RU" sz="1100" dirty="0" err="1" smtClean="0">
+                <a:solidFill>
+                  <a:schemeClr val="bg2"/>
+                </a:solidFill>
+              </a:rPr>
+              <a:t>состоанияе</a:t>
+            </a:r>
+            <a:r>
+              <a:rPr lang="ru-RU" sz="1100" dirty="0" smtClean="0">
+                <a:solidFill>
+                  <a:schemeClr val="bg2"/>
+                </a:solidFill>
+              </a:rPr>
+              <a:t> Движение вверх </a:t>
+            </a:r>
+            <a:r>
+              <a:rPr lang="ru-RU" sz="1100" dirty="0" err="1" smtClean="0">
+                <a:solidFill>
+                  <a:schemeClr val="bg2"/>
+                </a:solidFill>
+              </a:rPr>
+              <a:t>медлено</a:t>
+            </a:r>
+            <a:r>
+              <a:rPr lang="ru-RU" sz="1100" dirty="0" smtClean="0">
+                <a:solidFill>
+                  <a:schemeClr val="bg2"/>
+                </a:solidFill>
+              </a:rPr>
+              <a:t>. </a:t>
+            </a:r>
+          </a:p>
+          <a:p>
+            <a:pPr marL="171450" indent="-171450">
+              <a:buFont typeface="Arial" panose="020B0604020202020204" pitchFamily="34" charset="0"/>
+              <a:buChar char="•"/>
+            </a:pPr>
+            <a:r>
+              <a:rPr lang="ru-RU" sz="1100" dirty="0" smtClean="0">
+                <a:solidFill>
+                  <a:schemeClr val="bg2"/>
+                </a:solidFill>
+              </a:rPr>
+              <a:t>Ожидаем сигнал от датчика – Этаж вверх.</a:t>
+            </a:r>
+          </a:p>
+          <a:p>
+            <a:pPr marL="171450" indent="-171450">
+              <a:buFont typeface="Arial" panose="020B0604020202020204" pitchFamily="34" charset="0"/>
+              <a:buChar char="•"/>
+            </a:pPr>
+            <a:r>
+              <a:rPr lang="ru-RU" sz="1100" dirty="0" smtClean="0">
+                <a:solidFill>
+                  <a:schemeClr val="bg2"/>
+                </a:solidFill>
+              </a:rPr>
+              <a:t>Активируем быстрое движение вверх – </a:t>
+            </a:r>
+            <a:r>
+              <a:rPr lang="ru-RU" sz="1100" dirty="0" err="1" smtClean="0">
+                <a:solidFill>
+                  <a:schemeClr val="bg2"/>
+                </a:solidFill>
+              </a:rPr>
+              <a:t>состоаняие</a:t>
+            </a:r>
+            <a:r>
+              <a:rPr lang="ru-RU" sz="1100" dirty="0" smtClean="0">
+                <a:solidFill>
+                  <a:schemeClr val="bg2"/>
+                </a:solidFill>
+              </a:rPr>
+              <a:t> Движение вверх быстро. Возможно </a:t>
+            </a:r>
+            <a:r>
+              <a:rPr lang="ru-RU" sz="1100" dirty="0" err="1" smtClean="0">
+                <a:solidFill>
+                  <a:schemeClr val="bg2"/>
+                </a:solidFill>
+              </a:rPr>
+              <a:t>сдесь</a:t>
+            </a:r>
+            <a:r>
+              <a:rPr lang="ru-RU" sz="1100" dirty="0" smtClean="0">
+                <a:solidFill>
+                  <a:schemeClr val="bg2"/>
+                </a:solidFill>
+              </a:rPr>
+              <a:t> еще проверку на </a:t>
+            </a:r>
+            <a:r>
+              <a:rPr lang="ru-RU" sz="1100" dirty="0" err="1" smtClean="0">
+                <a:solidFill>
+                  <a:schemeClr val="bg2"/>
+                </a:solidFill>
+              </a:rPr>
+              <a:t>текушие</a:t>
+            </a:r>
+            <a:r>
+              <a:rPr lang="ru-RU" sz="1100" dirty="0" smtClean="0">
+                <a:solidFill>
+                  <a:schemeClr val="bg2"/>
+                </a:solidFill>
+              </a:rPr>
+              <a:t> состояние. </a:t>
+            </a:r>
+          </a:p>
+          <a:p>
+            <a:pPr marL="171450" indent="-171450">
+              <a:buFont typeface="Arial" panose="020B0604020202020204" pitchFamily="34" charset="0"/>
+              <a:buChar char="•"/>
+            </a:pPr>
+            <a:r>
+              <a:rPr lang="ru-RU" sz="1100" dirty="0" smtClean="0">
+                <a:solidFill>
+                  <a:schemeClr val="bg2"/>
+                </a:solidFill>
+              </a:rPr>
+              <a:t>Ожидаем сигнал от датчика этажа низ.</a:t>
+            </a:r>
+          </a:p>
+          <a:p>
+            <a:pPr marL="171450" indent="-171450">
+              <a:buFont typeface="Arial" panose="020B0604020202020204" pitchFamily="34" charset="0"/>
+              <a:buChar char="•"/>
+            </a:pPr>
+            <a:r>
+              <a:rPr lang="ru-RU" sz="1100" dirty="0" smtClean="0">
+                <a:solidFill>
+                  <a:schemeClr val="bg2"/>
+                </a:solidFill>
+              </a:rPr>
+              <a:t> Если </a:t>
+            </a:r>
+            <a:r>
+              <a:rPr lang="ru-RU" sz="1100" dirty="0" err="1" smtClean="0">
+                <a:solidFill>
+                  <a:schemeClr val="bg2"/>
+                </a:solidFill>
+              </a:rPr>
+              <a:t>внешня</a:t>
+            </a:r>
+            <a:r>
+              <a:rPr lang="ru-RU" sz="1100" dirty="0" smtClean="0">
+                <a:solidFill>
+                  <a:schemeClr val="bg2"/>
+                </a:solidFill>
+              </a:rPr>
+              <a:t> кнопка – этаж == </a:t>
+            </a:r>
+            <a:r>
+              <a:rPr lang="ru-RU" sz="1100" dirty="0" smtClean="0">
+                <a:solidFill>
+                  <a:schemeClr val="bg2"/>
+                </a:solidFill>
+              </a:rPr>
+              <a:t>1, </a:t>
+            </a:r>
+            <a:r>
+              <a:rPr lang="ru-RU" sz="1100" dirty="0" smtClean="0">
+                <a:solidFill>
+                  <a:schemeClr val="bg2"/>
+                </a:solidFill>
+              </a:rPr>
+              <a:t>тогда уменьшаем высокую скорость – </a:t>
+            </a:r>
+            <a:r>
+              <a:rPr lang="ru-RU" sz="1100" dirty="0" err="1" smtClean="0">
+                <a:solidFill>
+                  <a:schemeClr val="bg2"/>
+                </a:solidFill>
+              </a:rPr>
+              <a:t>состоаяние</a:t>
+            </a:r>
+            <a:r>
+              <a:rPr lang="ru-RU" sz="1100" dirty="0" smtClean="0">
+                <a:solidFill>
+                  <a:schemeClr val="bg2"/>
+                </a:solidFill>
+              </a:rPr>
+              <a:t> движение вверх </a:t>
+            </a:r>
+            <a:r>
+              <a:rPr lang="ru-RU" sz="1100" dirty="0" err="1" smtClean="0">
+                <a:solidFill>
+                  <a:schemeClr val="bg2"/>
+                </a:solidFill>
+              </a:rPr>
+              <a:t>медлено</a:t>
+            </a:r>
+            <a:r>
+              <a:rPr lang="ru-RU" sz="1100" dirty="0" smtClean="0">
+                <a:solidFill>
+                  <a:schemeClr val="bg2"/>
+                </a:solidFill>
+              </a:rPr>
+              <a:t>.</a:t>
+            </a:r>
+          </a:p>
+          <a:p>
+            <a:pPr marL="171450" indent="-171450">
+              <a:buFont typeface="Arial" panose="020B0604020202020204" pitchFamily="34" charset="0"/>
+              <a:buChar char="•"/>
+            </a:pPr>
+            <a:r>
+              <a:rPr lang="ru-RU" sz="1100" dirty="0" smtClean="0">
+                <a:solidFill>
+                  <a:schemeClr val="bg2"/>
+                </a:solidFill>
+              </a:rPr>
+              <a:t>Ожидаем сигнал от датчика этажа. ++Этаж.</a:t>
+            </a:r>
+          </a:p>
+          <a:p>
+            <a:pPr marL="171450" indent="-171450">
+              <a:buFont typeface="Arial" panose="020B0604020202020204" pitchFamily="34" charset="0"/>
+              <a:buChar char="•"/>
+            </a:pPr>
+            <a:r>
+              <a:rPr lang="ru-RU" sz="1100" dirty="0" smtClean="0">
+                <a:solidFill>
+                  <a:schemeClr val="bg2"/>
+                </a:solidFill>
+              </a:rPr>
+              <a:t> Если </a:t>
+            </a:r>
+            <a:r>
+              <a:rPr lang="ru-RU" sz="1100" dirty="0" err="1" smtClean="0">
+                <a:solidFill>
+                  <a:schemeClr val="bg2"/>
+                </a:solidFill>
+              </a:rPr>
+              <a:t>внешня</a:t>
+            </a:r>
+            <a:r>
+              <a:rPr lang="ru-RU" sz="1100" dirty="0" smtClean="0">
+                <a:solidFill>
+                  <a:schemeClr val="bg2"/>
+                </a:solidFill>
+              </a:rPr>
+              <a:t> кнопка == этаж, тогда останавливаем лифт – состояние </a:t>
+            </a:r>
+            <a:r>
+              <a:rPr lang="en-US" sz="1100" dirty="0" smtClean="0">
+                <a:solidFill>
+                  <a:schemeClr val="bg2"/>
+                </a:solidFill>
+              </a:rPr>
+              <a:t>Stop. </a:t>
+            </a:r>
+            <a:endParaRPr lang="uk-UA" sz="1100" dirty="0">
+              <a:solidFill>
+                <a:schemeClr val="bg2"/>
+              </a:solidFill>
+            </a:endParaRPr>
+          </a:p>
+          <a:p>
+            <a:pPr marL="171450" indent="-171450">
+              <a:buFont typeface="Arial" panose="020B0604020202020204" pitchFamily="34" charset="0"/>
+              <a:buChar char="•"/>
+            </a:pPr>
+            <a:r>
+              <a:rPr lang="uk-UA" sz="1100" dirty="0" err="1" smtClean="0">
+                <a:solidFill>
+                  <a:schemeClr val="bg2"/>
+                </a:solidFill>
+              </a:rPr>
+              <a:t>Активируим</a:t>
+            </a:r>
+            <a:r>
+              <a:rPr lang="uk-UA" sz="1100" dirty="0" smtClean="0">
+                <a:solidFill>
+                  <a:schemeClr val="bg2"/>
+                </a:solidFill>
+              </a:rPr>
+              <a:t> </a:t>
+            </a:r>
+            <a:r>
+              <a:rPr lang="uk-UA" sz="1100" dirty="0" err="1" smtClean="0">
+                <a:solidFill>
+                  <a:schemeClr val="bg2"/>
+                </a:solidFill>
+              </a:rPr>
+              <a:t>двери</a:t>
+            </a:r>
+            <a:r>
+              <a:rPr lang="uk-UA" sz="1100" dirty="0" smtClean="0">
+                <a:solidFill>
+                  <a:schemeClr val="bg2"/>
+                </a:solidFill>
+              </a:rPr>
+              <a:t> – </a:t>
+            </a:r>
+            <a:r>
+              <a:rPr lang="uk-UA" sz="1100" dirty="0" err="1" smtClean="0">
+                <a:solidFill>
+                  <a:schemeClr val="bg2"/>
+                </a:solidFill>
+              </a:rPr>
+              <a:t>стояние</a:t>
+            </a:r>
+            <a:r>
+              <a:rPr lang="uk-UA" sz="1100" dirty="0" smtClean="0">
+                <a:solidFill>
+                  <a:schemeClr val="bg2"/>
+                </a:solidFill>
+              </a:rPr>
+              <a:t> </a:t>
+            </a:r>
+            <a:r>
+              <a:rPr lang="uk-UA" sz="1100" dirty="0" err="1" smtClean="0">
+                <a:solidFill>
+                  <a:schemeClr val="bg2"/>
+                </a:solidFill>
+              </a:rPr>
+              <a:t>двери</a:t>
+            </a:r>
+            <a:r>
+              <a:rPr lang="uk-UA" sz="1100" dirty="0" smtClean="0">
+                <a:solidFill>
+                  <a:schemeClr val="bg2"/>
+                </a:solidFill>
+              </a:rPr>
+              <a:t> </a:t>
+            </a:r>
+            <a:r>
+              <a:rPr lang="uk-UA" sz="1100" dirty="0" err="1" smtClean="0">
+                <a:solidFill>
+                  <a:schemeClr val="bg2"/>
+                </a:solidFill>
+              </a:rPr>
+              <a:t>откр</a:t>
+            </a:r>
+            <a:r>
+              <a:rPr lang="ru-RU" sz="1100" dirty="0" err="1" smtClean="0">
+                <a:solidFill>
+                  <a:schemeClr val="bg2"/>
+                </a:solidFill>
+              </a:rPr>
+              <a:t>ываються</a:t>
+            </a:r>
+            <a:r>
+              <a:rPr lang="ru-RU" sz="1100" dirty="0" smtClean="0">
+                <a:solidFill>
+                  <a:schemeClr val="bg2"/>
+                </a:solidFill>
+              </a:rPr>
+              <a:t>.</a:t>
+            </a:r>
+          </a:p>
+          <a:p>
+            <a:pPr marL="171450" indent="-171450">
+              <a:buFont typeface="Arial" panose="020B0604020202020204" pitchFamily="34" charset="0"/>
+              <a:buChar char="•"/>
+            </a:pPr>
+            <a:r>
+              <a:rPr lang="ru-RU" sz="1100" dirty="0" smtClean="0">
+                <a:solidFill>
+                  <a:schemeClr val="bg2"/>
+                </a:solidFill>
+              </a:rPr>
+              <a:t>Ожидаем сигнал от датчика  - открытия дверей. </a:t>
+            </a:r>
+          </a:p>
+          <a:p>
+            <a:pPr marL="171450" indent="-171450">
+              <a:buFont typeface="Arial" panose="020B0604020202020204" pitchFamily="34" charset="0"/>
+              <a:buChar char="•"/>
+            </a:pPr>
+            <a:r>
+              <a:rPr lang="ru-RU" sz="1100" dirty="0" smtClean="0">
+                <a:solidFill>
+                  <a:schemeClr val="bg2"/>
+                </a:solidFill>
+              </a:rPr>
+              <a:t>При получении сигнала от датчика </a:t>
+            </a:r>
+            <a:r>
+              <a:rPr lang="ru-RU" sz="1100" dirty="0" err="1" smtClean="0">
+                <a:solidFill>
+                  <a:schemeClr val="bg2"/>
+                </a:solidFill>
+              </a:rPr>
+              <a:t>окрытия</a:t>
+            </a:r>
+            <a:r>
+              <a:rPr lang="ru-RU" sz="1100" dirty="0" smtClean="0">
+                <a:solidFill>
+                  <a:schemeClr val="bg2"/>
+                </a:solidFill>
+              </a:rPr>
+              <a:t> </a:t>
+            </a:r>
+            <a:r>
+              <a:rPr lang="ru-RU" sz="1100" dirty="0" err="1" smtClean="0">
+                <a:solidFill>
+                  <a:schemeClr val="bg2"/>
+                </a:solidFill>
+              </a:rPr>
+              <a:t>дверйе</a:t>
+            </a:r>
+            <a:r>
+              <a:rPr lang="ru-RU" sz="1100" dirty="0" smtClean="0">
+                <a:solidFill>
+                  <a:schemeClr val="bg2"/>
+                </a:solidFill>
+              </a:rPr>
+              <a:t> </a:t>
+            </a:r>
+            <a:r>
+              <a:rPr lang="ru-RU" sz="1100" dirty="0" err="1" smtClean="0">
+                <a:solidFill>
+                  <a:schemeClr val="bg2"/>
+                </a:solidFill>
+              </a:rPr>
+              <a:t>останавливаим</a:t>
+            </a:r>
+            <a:r>
+              <a:rPr lang="ru-RU" sz="1100" dirty="0" smtClean="0">
+                <a:solidFill>
+                  <a:schemeClr val="bg2"/>
+                </a:solidFill>
+              </a:rPr>
+              <a:t> </a:t>
+            </a:r>
+            <a:r>
+              <a:rPr lang="ru-RU" sz="1100" dirty="0" err="1" smtClean="0">
+                <a:solidFill>
+                  <a:schemeClr val="bg2"/>
+                </a:solidFill>
+              </a:rPr>
+              <a:t>актуатор</a:t>
+            </a:r>
+            <a:r>
+              <a:rPr lang="ru-RU" sz="1100" dirty="0" smtClean="0">
+                <a:solidFill>
+                  <a:schemeClr val="bg2"/>
+                </a:solidFill>
+              </a:rPr>
+              <a:t> – состояние дверь открыта.</a:t>
+            </a:r>
+          </a:p>
+          <a:p>
+            <a:r>
+              <a:rPr lang="ru-RU" sz="1100" dirty="0" smtClean="0">
+                <a:solidFill>
+                  <a:schemeClr val="bg2"/>
+                </a:solidFill>
+              </a:rPr>
+              <a:t>Этаж = </a:t>
+            </a:r>
+            <a:r>
+              <a:rPr lang="ru-RU" sz="1100" dirty="0" err="1" smtClean="0">
+                <a:solidFill>
+                  <a:schemeClr val="bg2"/>
+                </a:solidFill>
+              </a:rPr>
+              <a:t>вненей</a:t>
+            </a:r>
+            <a:r>
+              <a:rPr lang="ru-RU" sz="1100" dirty="0" smtClean="0">
+                <a:solidFill>
+                  <a:schemeClr val="bg2"/>
+                </a:solidFill>
+              </a:rPr>
+              <a:t> кнопки этажа, состояние </a:t>
+            </a:r>
+            <a:r>
+              <a:rPr lang="ru-RU" sz="1100" dirty="0" err="1" smtClean="0">
+                <a:solidFill>
+                  <a:schemeClr val="bg2"/>
+                </a:solidFill>
+              </a:rPr>
+              <a:t>дверй</a:t>
+            </a:r>
+            <a:r>
+              <a:rPr lang="ru-RU" sz="1100" dirty="0" smtClean="0">
+                <a:solidFill>
+                  <a:schemeClr val="bg2"/>
+                </a:solidFill>
+              </a:rPr>
+              <a:t> открыто, состояние кабины Остановка.  </a:t>
+            </a:r>
+          </a:p>
+          <a:p>
+            <a:pPr marL="171450" indent="-171450">
+              <a:buFont typeface="Arial" panose="020B0604020202020204" pitchFamily="34" charset="0"/>
+              <a:buChar char="•"/>
+            </a:pPr>
+            <a:endParaRPr lang="ru-RU" sz="1100" dirty="0">
+              <a:solidFill>
+                <a:schemeClr val="bg2"/>
+              </a:solidFill>
+            </a:endParaRPr>
+          </a:p>
+          <a:p>
+            <a:pPr marL="171450" indent="-171450">
+              <a:buFont typeface="Arial" panose="020B0604020202020204" pitchFamily="34" charset="0"/>
+              <a:buChar char="•"/>
+            </a:pPr>
+            <a:endParaRPr lang="ru-RU" sz="1200" dirty="0"/>
+          </a:p>
+        </p:txBody>
+      </p:sp>
+      <p:pic>
+        <p:nvPicPr>
+          <p:cNvPr id="5" name="Рисунок 4"/>
+          <p:cNvPicPr>
+            <a:picLocks noChangeAspect="1"/>
+          </p:cNvPicPr>
+          <p:nvPr/>
+        </p:nvPicPr>
+        <p:blipFill rotWithShape="1">
+          <a:blip r:embed="rId2"/>
+          <a:srcRect r="64348"/>
+          <a:stretch/>
+        </p:blipFill>
+        <p:spPr>
+          <a:xfrm>
+            <a:off x="160964" y="2457361"/>
+            <a:ext cx="1517230" cy="2546290"/>
+          </a:xfrm>
+          <a:prstGeom prst="rect">
+            <a:avLst/>
+          </a:prstGeom>
+        </p:spPr>
+      </p:pic>
+    </p:spTree>
+    <p:extLst>
+      <p:ext uri="{BB962C8B-B14F-4D97-AF65-F5344CB8AC3E}">
+        <p14:creationId xmlns:p14="http://schemas.microsoft.com/office/powerpoint/2010/main" val="2518790678"/>
+      </p:ext>
+    </p:extLst>
+  </p:cSld>
+  <p:clrMapOvr>
+    <a:masterClrMapping/>
+  </p:clrMapOvr>
+  <p:timing>
+    <p:tnLst>
+      <p:par>
+        <p:cTn id="1" dur="indefinite" restart="never" nodeType="tmRoot"/>
+      </p:par>
+    </p:tnLst>
+  </p:timing>
+</p:sld>
+</file>
+
+<file path=ppt/slides/slide11.xml><?xml version="1.0" encoding="utf-8"?>
+<p:sld xmlns:a="http://schemas.openxmlformats.org/drawingml/2006/main" xmlns:r="http://schemas.openxmlformats.org/officeDocument/2006/relationships" xmlns:p="http://schemas.openxmlformats.org/presentationml/2006/main">
+  <p:cSld>
+    <p:spTree>
+      <p:nvGrpSpPr>
+        <p:cNvPr id="1" name=""/>
+        <p:cNvGrpSpPr/>
+        <p:nvPr/>
+      </p:nvGrpSpPr>
+      <p:grpSpPr>
+        <a:xfrm>
+          <a:off x="0" y="0"/>
+          <a:ext cx="0" cy="0"/>
+          <a:chOff x="0" y="0"/>
+          <a:chExt cx="0" cy="0"/>
+        </a:xfrm>
+      </p:grpSpPr>
+      <p:sp>
+        <p:nvSpPr>
           <p:cNvPr id="2" name="TextBox 1"/>
           <p:cNvSpPr txBox="1"/>
           <p:nvPr/>
@@ -38878,7 +39532,7 @@
 </p:sld>
 </file>
 
-<file path=ppt/slides/slide11.xml><?xml version="1.0" encoding="utf-8"?>
+<file path=ppt/slides/slide12.xml><?xml version="1.0" encoding="utf-8"?>
 <p:sld xmlns:a="http://schemas.openxmlformats.org/drawingml/2006/main" xmlns:r="http://schemas.openxmlformats.org/officeDocument/2006/relationships" xmlns:p="http://schemas.openxmlformats.org/presentationml/2006/main">
   <p:cSld>
     <p:spTree>
@@ -39797,7 +40451,7 @@
 </p:sld>
 </file>
 
-<file path=ppt/slides/slide12.xml><?xml version="1.0" encoding="utf-8"?>
+<file path=ppt/slides/slide13.xml><?xml version="1.0" encoding="utf-8"?>
 <p:sld xmlns:a="http://schemas.openxmlformats.org/drawingml/2006/main" xmlns:r="http://schemas.openxmlformats.org/officeDocument/2006/relationships" xmlns:p="http://schemas.openxmlformats.org/presentationml/2006/main">
   <p:cSld>
     <p:spTree>
@@ -40191,7 +40845,7 @@
 </p:sld>
 </file>
 
-<file path=ppt/slides/slide13.xml><?xml version="1.0" encoding="utf-8"?>
+<file path=ppt/slides/slide14.xml><?xml version="1.0" encoding="utf-8"?>
 <p:sld xmlns:a="http://schemas.openxmlformats.org/drawingml/2006/main" xmlns:r="http://schemas.openxmlformats.org/officeDocument/2006/relationships" xmlns:p="http://schemas.openxmlformats.org/presentationml/2006/main">
   <p:cSld>
     <p:spTree>
@@ -41580,7 +42234,7 @@
 </p:sld>
 </file>
 
-<file path=ppt/slides/slide14.xml><?xml version="1.0" encoding="utf-8"?>
+<file path=ppt/slides/slide15.xml><?xml version="1.0" encoding="utf-8"?>
 <p:sld xmlns:a="http://schemas.openxmlformats.org/drawingml/2006/main" xmlns:r="http://schemas.openxmlformats.org/officeDocument/2006/relationships" xmlns:p="http://schemas.openxmlformats.org/presentationml/2006/main">
   <p:cSld>
     <p:spTree>
@@ -41617,7 +42271,7 @@
 </p:sld>
 </file>
 
-<file path=ppt/slides/slide15.xml><?xml version="1.0" encoding="utf-8"?>
+<file path=ppt/slides/slide16.xml><?xml version="1.0" encoding="utf-8"?>
 <p:sld xmlns:a="http://schemas.openxmlformats.org/drawingml/2006/main" xmlns:r="http://schemas.openxmlformats.org/officeDocument/2006/relationships" xmlns:p="http://schemas.openxmlformats.org/presentationml/2006/main">
   <p:cSld>
     <p:spTree>
@@ -49481,8 +50135,8 @@
         </p:nvSpPr>
         <p:spPr>
           <a:xfrm>
-            <a:off x="201600" y="108000"/>
-            <a:ext cx="6853158" cy="2431435"/>
+            <a:off x="158569" y="0"/>
+            <a:ext cx="6853158" cy="2585323"/>
           </a:xfrm>
           <a:prstGeom prst="rect">
             <a:avLst/>
@@ -49562,25 +50216,9 @@
             </a:r>
             <a:r>
               <a:rPr lang="ru-RU" sz="1000" dirty="0" smtClean="0"/>
-              <a:t>дверей – состояние</a:t>
-            </a:r>
-            <a:r>
-              <a:rPr lang="en-US" sz="1000" dirty="0" smtClean="0"/>
-              <a:t> Door</a:t>
-            </a:r>
-            <a:r>
-              <a:rPr lang="ru-RU" sz="1000" dirty="0" smtClean="0"/>
-              <a:t> </a:t>
-            </a:r>
-            <a:r>
-              <a:rPr lang="en-US" sz="1000" dirty="0" err="1" smtClean="0"/>
-              <a:t>Closening</a:t>
-            </a:r>
-            <a:r>
-              <a:rPr lang="en-US" sz="1000" dirty="0" smtClean="0"/>
-              <a:t>.</a:t>
-            </a:r>
-            <a:endParaRPr lang="ru-RU" sz="1000" dirty="0" smtClean="0"/>
+              <a:t>дверей </a:t>
+            </a:r>
+            <a:endParaRPr lang="en-US" sz="1000" dirty="0" smtClean="0"/>
           </a:p>
           <a:p>
             <a:pPr marL="171450" indent="-171450">
@@ -49589,7 +50227,11 @@
             </a:pPr>
             <a:r>
               <a:rPr lang="ru-RU" sz="1000" dirty="0" smtClean="0"/>
-              <a:t>Ожидается сигнал от датчика что дверь закрыта</a:t>
+              <a:t>Ожидается </a:t>
+            </a:r>
+            <a:r>
+              <a:rPr lang="ru-RU" sz="1000" dirty="0" smtClean="0"/>
+              <a:t>сигнал от датчика что дверь закрыта</a:t>
             </a:r>
             <a:r>
               <a:rPr lang="en-US" sz="1000" dirty="0" smtClean="0"/>
@@ -49634,12 +50276,8 @@
               <a:buChar char="•"/>
             </a:pPr>
             <a:r>
-              <a:rPr lang="ru-RU" sz="1000" smtClean="0"/>
-              <a:t>Отключаться </a:t>
-            </a:r>
-            <a:r>
               <a:rPr lang="ru-RU" sz="1000" dirty="0" smtClean="0"/>
-              <a:t>тормоза кабины. </a:t>
+              <a:t>Отключаться тормоза кабины. </a:t>
             </a:r>
           </a:p>
           <a:p>
@@ -49853,7 +50491,15 @@
                   <a:schemeClr val="bg2"/>
                 </a:solidFill>
               </a:rPr>
-              <a:t>  тормоза</a:t>
+              <a:t>  </a:t>
+            </a:r>
+            <a:r>
+              <a:rPr lang="ru-RU" sz="1000" dirty="0" smtClean="0">
+                <a:solidFill>
+                  <a:schemeClr val="bg2"/>
+                </a:solidFill>
+              </a:rPr>
+              <a:t>тормоза</a:t>
             </a:r>
             <a:endParaRPr lang="en-US" sz="1000" dirty="0" smtClean="0">
               <a:solidFill>
@@ -49862,6 +50508,33 @@
             </a:endParaRPr>
           </a:p>
           <a:p>
+            <a:pPr marL="171450" indent="-171450">
+              <a:buFont typeface="Arial" panose="020B0604020202020204" pitchFamily="34" charset="0"/>
+              <a:buChar char="•"/>
+            </a:pPr>
+            <a:r>
+              <a:rPr lang="ru-RU" sz="1000" dirty="0" err="1" smtClean="0">
+                <a:solidFill>
+                  <a:schemeClr val="bg2"/>
+                </a:solidFill>
+              </a:rPr>
+              <a:t>Открываються</a:t>
+            </a:r>
+            <a:r>
+              <a:rPr lang="ru-RU" sz="1000" dirty="0" smtClean="0">
+                <a:solidFill>
+                  <a:schemeClr val="bg2"/>
+                </a:solidFill>
+              </a:rPr>
+              <a:t> двери</a:t>
+            </a:r>
+            <a:endParaRPr lang="en-US" sz="1000" dirty="0" smtClean="0">
+              <a:solidFill>
+                <a:schemeClr val="bg2"/>
+              </a:solidFill>
+            </a:endParaRPr>
+          </a:p>
+          <a:p>
             <a:r>
               <a:rPr lang="uk-UA" sz="1000" dirty="0" smtClean="0">
                 <a:solidFill>
@@ -49916,11 +50589,72 @@
                   <a:schemeClr val="bg2"/>
                 </a:solidFill>
               </a:rPr>
-              <a:t>Cabin Stop, Door Close. </a:t>
-            </a:r>
+              <a:t>Cabin Stop, </a:t>
+            </a:r>
+            <a:r>
+              <a:rPr lang="en-US" sz="1000" dirty="0" smtClean="0">
+                <a:solidFill>
+                  <a:schemeClr val="bg2"/>
+                </a:solidFill>
+              </a:rPr>
+              <a:t>Door</a:t>
+            </a:r>
+            <a:r>
+              <a:rPr lang="ru-RU" sz="1000" dirty="0">
+                <a:solidFill>
+                  <a:schemeClr val="bg2"/>
+                </a:solidFill>
+              </a:rPr>
+              <a:t> </a:t>
+            </a:r>
+            <a:r>
+              <a:rPr lang="en-US" sz="1000" dirty="0" smtClean="0">
+                <a:solidFill>
+                  <a:schemeClr val="bg2"/>
+                </a:solidFill>
+              </a:rPr>
+              <a:t>Open</a:t>
+            </a:r>
+            <a:r>
+              <a:rPr lang="en-US" sz="1000" dirty="0" smtClean="0">
+                <a:solidFill>
+                  <a:schemeClr val="bg2"/>
+                </a:solidFill>
+              </a:rPr>
+              <a:t>. </a:t>
+            </a:r>
+            <a:endParaRPr lang="en-US" sz="1000" dirty="0" smtClean="0">
+              <a:solidFill>
+                <a:schemeClr val="bg2"/>
+              </a:solidFill>
+            </a:endParaRPr>
           </a:p>
         </p:txBody>
       </p:sp>
+      <p:pic>
+        <p:nvPicPr>
+          <p:cNvPr id="3" name="Рисунок 2"/>
+          <p:cNvPicPr>
+            <a:picLocks noChangeAspect="1"/>
+          </p:cNvPicPr>
+          <p:nvPr/>
+        </p:nvPicPr>
+        <p:blipFill>
+          <a:blip r:embed="rId2"/>
+          <a:stretch>
+            <a:fillRect/>
+          </a:stretch>
+        </p:blipFill>
+        <p:spPr>
+          <a:xfrm>
+            <a:off x="3765838" y="2129141"/>
+            <a:ext cx="4517549" cy="2826016"/>
+          </a:xfrm>
+          <a:prstGeom prst="rect">
+            <a:avLst/>
+          </a:prstGeom>
+        </p:spPr>
+      </p:pic>
     </p:spTree>
     <p:extLst>
       <p:ext uri="{BB962C8B-B14F-4D97-AF65-F5344CB8AC3E}">
@@ -50498,7 +51232,7 @@
         <p:spPr>
           <a:xfrm>
             <a:off x="0" y="833296"/>
-            <a:ext cx="8833200" cy="2662267"/>
+            <a:ext cx="8833200" cy="2831544"/>
           </a:xfrm>
           <a:prstGeom prst="rect">
             <a:avLst/>
@@ -50539,44 +51273,20 @@
               <a:buChar char="•"/>
             </a:pPr>
             <a:r>
+              <a:rPr lang="ru-RU" sz="1100" dirty="0" err="1" smtClean="0">
+                <a:solidFill>
+                  <a:schemeClr val="bg2"/>
+                </a:solidFill>
+              </a:rPr>
+              <a:t>Закрываютьс</a:t>
+            </a:r>
+            <a:r>
               <a:rPr lang="ru-RU" sz="1100" dirty="0" smtClean="0">
                 <a:solidFill>
                   <a:schemeClr val="bg2"/>
                 </a:solidFill>
               </a:rPr>
-              <a:t>Активируем медленное движение вверх – </a:t>
-            </a:r>
-            <a:r>
-              <a:rPr lang="ru-RU" sz="1100" dirty="0" err="1" smtClean="0">
-                <a:solidFill>
-                  <a:schemeClr val="bg2"/>
-                </a:solidFill>
-              </a:rPr>
-              <a:t>состоанияе</a:t>
-            </a:r>
-            <a:r>
-              <a:rPr lang="ru-RU" sz="1100" dirty="0" smtClean="0">
-                <a:solidFill>
-                  <a:schemeClr val="bg2"/>
-                </a:solidFill>
-              </a:rPr>
-              <a:t> Движение вверх </a:t>
-            </a:r>
-            <a:r>
-              <a:rPr lang="ru-RU" sz="1100" dirty="0" err="1" smtClean="0">
-                <a:solidFill>
-                  <a:schemeClr val="bg2"/>
-                </a:solidFill>
-              </a:rPr>
-              <a:t>медлено</a:t>
-            </a:r>
-            <a:r>
-              <a:rPr lang="ru-RU" sz="1100" dirty="0" smtClean="0">
-                <a:solidFill>
-                  <a:schemeClr val="bg2"/>
-                </a:solidFill>
-              </a:rPr>
-              <a:t>. </a:t>
+              <a:t> двери</a:t>
             </a:r>
           </a:p>
           <a:p>
@@ -50590,7 +51300,47 @@
                   <a:schemeClr val="bg2"/>
                 </a:solidFill>
               </a:rPr>
-              <a:t>Ожидаем сигнал от датчика – Этаж вверх.</a:t>
+              <a:t>Активируем </a:t>
+            </a:r>
+            <a:r>
+              <a:rPr lang="ru-RU" sz="1100" dirty="0" smtClean="0">
+                <a:solidFill>
+                  <a:schemeClr val="bg2"/>
+                </a:solidFill>
+              </a:rPr>
+              <a:t>медленное движение вверх – </a:t>
+            </a:r>
+            <a:r>
+              <a:rPr lang="ru-RU" sz="1100" dirty="0" err="1" smtClean="0">
+                <a:solidFill>
+                  <a:schemeClr val="bg2"/>
+                </a:solidFill>
+              </a:rPr>
+              <a:t>состоанияе</a:t>
+            </a:r>
+            <a:r>
+              <a:rPr lang="ru-RU" sz="1100" dirty="0" smtClean="0">
+                <a:solidFill>
+                  <a:schemeClr val="bg2"/>
+                </a:solidFill>
+              </a:rPr>
+              <a:t> Движение вверх </a:t>
+            </a:r>
+            <a:r>
+              <a:rPr lang="ru-RU" sz="1100" dirty="0" err="1" smtClean="0">
+                <a:solidFill>
+                  <a:schemeClr val="bg2"/>
+                </a:solidFill>
+              </a:rPr>
+              <a:t>медлено</a:t>
+            </a:r>
+            <a:r>
+              <a:rPr lang="ru-RU" sz="1100" dirty="0" smtClean="0">
+                <a:solidFill>
+                  <a:schemeClr val="bg2"/>
+                </a:solidFill>
+              </a:rPr>
+              <a:t>. </a:t>
             </a:r>
           </a:p>
           <a:p>
@@ -50604,55 +51354,7 @@
                   <a:schemeClr val="bg2"/>
                 </a:solidFill>
               </a:rPr>
-              <a:t>Активируем быстрое движение вверх – </a:t>
-            </a:r>
-            <a:r>
-              <a:rPr lang="ru-RU" sz="1100" dirty="0" err="1" smtClean="0">
-                <a:solidFill>
-                  <a:schemeClr val="bg2"/>
-                </a:solidFill>
-              </a:rPr>
-              <a:t>состоаняие</a:t>
-            </a:r>
-            <a:r>
-              <a:rPr lang="ru-RU" sz="1100" dirty="0" smtClean="0">
-                <a:solidFill>
-                  <a:schemeClr val="bg2"/>
-                </a:solidFill>
-              </a:rPr>
-              <a:t> Движение вверх быстро. Возможно </a:t>
-            </a:r>
-            <a:r>
-              <a:rPr lang="ru-RU" sz="1100" dirty="0" err="1" smtClean="0">
-                <a:solidFill>
-                  <a:schemeClr val="bg2"/>
-                </a:solidFill>
-              </a:rPr>
-              <a:t>сдесь</a:t>
-            </a:r>
-            <a:r>
-              <a:rPr lang="ru-RU" sz="1100" dirty="0" smtClean="0">
-                <a:solidFill>
-                  <a:schemeClr val="bg2"/>
-                </a:solidFill>
-              </a:rPr>
-              <a:t> еще проверку на </a:t>
-            </a:r>
-            <a:r>
-              <a:rPr lang="ru-RU" sz="1100" dirty="0" err="1" smtClean="0">
-                <a:solidFill>
-                  <a:schemeClr val="bg2"/>
-                </a:solidFill>
-              </a:rPr>
-              <a:t>текушие</a:t>
-            </a:r>
-            <a:r>
-              <a:rPr lang="ru-RU" sz="1100" dirty="0" smtClean="0">
-                <a:solidFill>
-                  <a:schemeClr val="bg2"/>
-                </a:solidFill>
-              </a:rPr>
-              <a:t> состояние. </a:t>
+              <a:t>Ожидаем сигнал от датчика – Этаж вверх.</a:t>
             </a:r>
           </a:p>
           <a:p>
@@ -50666,7 +51368,55 @@
                   <a:schemeClr val="bg2"/>
                 </a:solidFill>
               </a:rPr>
-              <a:t>Ожидаем сигнал от датчика этажа низ.</a:t>
+              <a:t>Активируем быстрое движение вверх – </a:t>
+            </a:r>
+            <a:r>
+              <a:rPr lang="ru-RU" sz="1100" dirty="0" err="1" smtClean="0">
+                <a:solidFill>
+                  <a:schemeClr val="bg2"/>
+                </a:solidFill>
+              </a:rPr>
+              <a:t>состоаняие</a:t>
+            </a:r>
+            <a:r>
+              <a:rPr lang="ru-RU" sz="1100" dirty="0" smtClean="0">
+                <a:solidFill>
+                  <a:schemeClr val="bg2"/>
+                </a:solidFill>
+              </a:rPr>
+              <a:t> Движение вверх быстро. Возможно </a:t>
+            </a:r>
+            <a:r>
+              <a:rPr lang="ru-RU" sz="1100" dirty="0" err="1" smtClean="0">
+                <a:solidFill>
+                  <a:schemeClr val="bg2"/>
+                </a:solidFill>
+              </a:rPr>
+              <a:t>сдесь</a:t>
+            </a:r>
+            <a:r>
+              <a:rPr lang="ru-RU" sz="1100" dirty="0" smtClean="0">
+                <a:solidFill>
+                  <a:schemeClr val="bg2"/>
+                </a:solidFill>
+              </a:rPr>
+              <a:t> еще проверку на </a:t>
+            </a:r>
+            <a:r>
+              <a:rPr lang="ru-RU" sz="1100" dirty="0" err="1" smtClean="0">
+                <a:solidFill>
+                  <a:schemeClr val="bg2"/>
+                </a:solidFill>
+              </a:rPr>
+              <a:t>текушие</a:t>
+            </a:r>
+            <a:r>
+              <a:rPr lang="ru-RU" sz="1100" dirty="0" smtClean="0">
+                <a:solidFill>
+                  <a:schemeClr val="bg2"/>
+                </a:solidFill>
+              </a:rPr>
+              <a:t> состояние. </a:t>
             </a:r>
           </a:p>
           <a:p>
@@ -50680,6 +51430,20 @@
                   <a:schemeClr val="bg2"/>
                 </a:solidFill>
               </a:rPr>
+              <a:t>Ожидаем сигнал от датчика этажа низ.</a:t>
+            </a:r>
+          </a:p>
+          <a:p>
+            <a:pPr marL="171450" indent="-171450">
+              <a:buFont typeface="Arial" panose="020B0604020202020204" pitchFamily="34" charset="0"/>
+              <a:buChar char="•"/>
+            </a:pPr>
+            <a:r>
+              <a:rPr lang="ru-RU" sz="1100" dirty="0" smtClean="0">
+                <a:solidFill>
+                  <a:schemeClr val="bg2"/>
+                </a:solidFill>
+              </a:rPr>
               <a:t> Если </a:t>
             </a:r>
             <a:r>
@@ -50696,7 +51460,23 @@
                   <a:schemeClr val="bg2"/>
                 </a:solidFill>
               </a:rPr>
-              <a:t> кнопка – этаж == 1, тогда уменьшаем высокую скорость – </a:t>
+              <a:t> кнопка – этаж == </a:t>
+            </a:r>
+            <a:r>
+              <a:rPr lang="ru-RU" sz="1100" dirty="0" smtClean="0">
+                <a:solidFill>
+                  <a:schemeClr val="bg2"/>
+                </a:solidFill>
+              </a:rPr>
+              <a:t>1, </a:t>
+            </a:r>
+            <a:r>
+              <a:rPr lang="ru-RU" sz="1100" dirty="0" smtClean="0">
+                <a:solidFill>
+                  <a:schemeClr val="bg2"/>
+                </a:solidFill>
+              </a:rPr>
+              <a:t>тогда уменьшаем высокую скорость – </a:t>
             </a:r>
             <a:r>
               <a:rPr lang="ru-RU" sz="1100" dirty="0" err="1" smtClean="0">
@@ -51045,7 +51825,7 @@
         <p:spPr>
           <a:xfrm>
             <a:off x="93600" y="33077"/>
-            <a:ext cx="7704000" cy="969496"/>
+            <a:ext cx="9168734" cy="1154162"/>
           </a:xfrm>
           <a:prstGeom prst="rect">
             <a:avLst/>
@@ -51072,7 +51852,30 @@
                   <a:schemeClr val="bg2"/>
                 </a:solidFill>
               </a:rPr>
-              <a:t>нешняя кнопка равна текущему этажу):</a:t>
+              <a:t>нешняя кнопка равна текущему этажу</a:t>
+            </a:r>
+            <a:r>
+              <a:rPr lang="ru-RU" sz="1200" b="1" dirty="0" smtClean="0">
+                <a:solidFill>
+                  <a:schemeClr val="bg2"/>
+                </a:solidFill>
+              </a:rPr>
+              <a:t>):</a:t>
+            </a:r>
+            <a:endParaRPr lang="en-US" sz="1200" b="1" dirty="0" smtClean="0">
+              <a:solidFill>
+                <a:schemeClr val="bg2"/>
+              </a:solidFill>
+            </a:endParaRPr>
+          </a:p>
+          <a:p>
+            <a:r>
+              <a:rPr lang="ru-RU" sz="1200" dirty="0" smtClean="0">
+                <a:solidFill>
+                  <a:schemeClr val="bg2"/>
+                </a:solidFill>
+              </a:rPr>
+              <a:t>Нечего не происходит так как двери всегда открыты. </a:t>
             </a:r>
             <a:endParaRPr lang="ru-RU" sz="1100" dirty="0" smtClean="0">
               <a:solidFill>

</xml_diff>